<commit_message>
adding link to dashboard
</commit_message>
<xml_diff>
--- a/Geredi-Niyibigira-Vehicle_Theft_Analysis_Presentation.pptx
+++ b/Geredi-Niyibigira-Vehicle_Theft_Analysis_Presentation.pptx
@@ -5,7 +5,7 @@
     <p:sldMasterId id="2147483648" r:id="rId1"/>
   </p:sldMasterIdLst>
   <p:notesMasterIdLst>
-    <p:notesMasterId r:id="rId16"/>
+    <p:notesMasterId r:id="rId17"/>
   </p:notesMasterIdLst>
   <p:sldIdLst>
     <p:sldId id="256" r:id="rId2"/>
@@ -22,6 +22,7 @@
     <p:sldId id="263" r:id="rId13"/>
     <p:sldId id="264" r:id="rId14"/>
     <p:sldId id="265" r:id="rId15"/>
+    <p:sldId id="274" r:id="rId16"/>
   </p:sldIdLst>
   <p:sldSz cx="9144000" cy="5143500" type="screen16x9"/>
   <p:notesSz cx="5143500" cy="9144000"/>
@@ -1484,7 +1485,7 @@
   <p:sldLayoutIdLst>
     <p:sldLayoutId id="2147483649" r:id="rId1"/>
   </p:sldLayoutIdLst>
-  <p:hf sldNum="0" hdr="0" ftr="0" dt="0"/>
+  <p:hf sldNum="0" hdr="0" dt="0"/>
   <p:txStyles>
     <p:titleStyle>
       <a:lvl1pPr algn="ctr" defTabSz="914400" rtl="0" eaLnBrk="1" latinLnBrk="0" hangingPunct="1">
@@ -4556,8 +4557,8 @@
         </p:nvSpPr>
         <p:spPr>
           <a:xfrm>
-            <a:off x="4714875" y="3711029"/>
-            <a:ext cx="3952875" cy="548580"/>
+            <a:off x="4714875" y="3489871"/>
+            <a:ext cx="3952875" cy="1038586"/>
           </a:xfrm>
           <a:prstGeom prst="roundRect">
             <a:avLst>
@@ -4608,32 +4609,187 @@
               <a:buNone/>
             </a:pPr>
             <a:r>
-              <a:rPr lang="en-US" sz="1200" b="1" dirty="0">
-                <a:solidFill>
-                  <a:srgbClr val="FFFFFF"/>
-                </a:solidFill>
-                <a:latin typeface="Arial" pitchFamily="34" charset="0"/>
-                <a:ea typeface="Arial" pitchFamily="34" charset="-122"/>
-                <a:cs typeface="Arial" pitchFamily="34" charset="-120"/>
-              </a:rPr>
-              <a:t>Next Step:</a:t>
-            </a:r>
-            <a:r>
-              <a:rPr lang="en-US" sz="1200" dirty="0">
-                <a:solidFill>
-                  <a:srgbClr val="FFFFFF"/>
-                </a:solidFill>
-                <a:latin typeface="Arial" pitchFamily="34" charset="0"/>
-                <a:ea typeface="Arial" pitchFamily="34" charset="-122"/>
-                <a:cs typeface="Arial" pitchFamily="34" charset="-120"/>
-              </a:rPr>
-              <a:t> Implement Phase 1 and quarterly reviews.</a:t>
-            </a:r>
-            <a:endParaRPr lang="en-US" sz="1200" dirty="0"/>
+              <a:rPr lang="en-GB" sz="1200" b="1" dirty="0">
+                <a:highlight>
+                  <a:srgbClr val="008000"/>
+                </a:highlight>
+              </a:rPr>
+              <a:t>Explore Dashboard:</a:t>
+            </a:r>
+            <a:r>
+              <a:rPr lang="en-GB" sz="1200" dirty="0">
+                <a:highlight>
+                  <a:srgbClr val="008000"/>
+                </a:highlight>
+              </a:rPr>
+              <a:t> </a:t>
+            </a:r>
+            <a:r>
+              <a:rPr lang="en-GB" sz="1200" dirty="0">
+                <a:solidFill>
+                  <a:schemeClr val="bg1"/>
+                </a:solidFill>
+                <a:hlinkClick r:id="rId6">
+                  <a:extLst>
+                    <a:ext uri="{A12FA001-AC4F-418D-AE19-62706E023703}">
+                      <ahyp:hlinkClr xmlns:ahyp="http://schemas.microsoft.com/office/drawing/2018/hyperlinkcolor" val="tx"/>
+                    </a:ext>
+                  </a:extLst>
+                </a:hlinkClick>
+              </a:rPr>
+              <a:t>https://geredi-niyibigira-cenfri-ds-fellow-5twh6csf74r2x2mab9vkq2.streamlit.app</a:t>
+            </a:r>
+            <a:endParaRPr lang="en-US" sz="1200" dirty="0">
+              <a:solidFill>
+                <a:schemeClr val="bg1"/>
+              </a:solidFill>
+            </a:endParaRPr>
           </a:p>
         </p:txBody>
       </p:sp>
     </p:spTree>
+  </p:cSld>
+  <p:clrMapOvr>
+    <a:masterClrMapping/>
+  </p:clrMapOvr>
+</p:sld>
+</file>
+
+<file path=ppt/slides/slide15.xml><?xml version="1.0" encoding="utf-8"?>
+<p:sld xmlns:a="http://schemas.openxmlformats.org/drawingml/2006/main" xmlns:r="http://schemas.openxmlformats.org/officeDocument/2006/relationships" xmlns:p="http://schemas.openxmlformats.org/presentationml/2006/main">
+  <p:cSld>
+    <p:spTree>
+      <p:nvGrpSpPr>
+        <p:cNvPr id="1" name=""/>
+        <p:cNvGrpSpPr/>
+        <p:nvPr/>
+      </p:nvGrpSpPr>
+      <p:grpSpPr>
+        <a:xfrm>
+          <a:off x="0" y="0"/>
+          <a:ext cx="0" cy="0"/>
+          <a:chOff x="0" y="0"/>
+          <a:chExt cx="0" cy="0"/>
+        </a:xfrm>
+      </p:grpSpPr>
+      <p:sp>
+        <p:nvSpPr>
+          <p:cNvPr id="2" name="Text 11">
+            <a:extLst>
+              <a:ext uri="{FF2B5EF4-FFF2-40B4-BE49-F238E27FC236}">
+                <a16:creationId xmlns:a16="http://schemas.microsoft.com/office/drawing/2014/main" id="{BA84DEEC-35DC-0516-D138-052516A5B35E}"/>
+              </a:ext>
+            </a:extLst>
+          </p:cNvPr>
+          <p:cNvSpPr/>
+          <p:nvPr/>
+        </p:nvSpPr>
+        <p:spPr>
+          <a:xfrm>
+            <a:off x="1270000" y="1595757"/>
+            <a:ext cx="6604000" cy="2286814"/>
+          </a:xfrm>
+          <a:prstGeom prst="roundRect">
+            <a:avLst>
+              <a:gd name="adj" fmla="val 13890"/>
+            </a:avLst>
+          </a:prstGeom>
+          <a:solidFill>
+            <a:srgbClr val="1E3A8A"/>
+          </a:solidFill>
+          <a:ln/>
+        </p:spPr>
+        <p:txBody>
+          <a:bodyPr wrap="square" rtlCol="0" anchor="ctr"/>
+          <a:lstStyle/>
+          <a:p>
+            <a:pPr marL="0" indent="0" algn="l">
+              <a:lnSpc>
+                <a:spcPts val="1920"/>
+              </a:lnSpc>
+              <a:buNone/>
+            </a:pPr>
+            <a:r>
+              <a:rPr lang="en-GB" sz="1800" b="1">
+                <a:highlight>
+                  <a:srgbClr val="008000"/>
+                </a:highlight>
+              </a:rPr>
+              <a:t>Explore Dashboard:</a:t>
+            </a:r>
+            <a:r>
+              <a:rPr lang="en-GB" sz="1800">
+                <a:highlight>
+                  <a:srgbClr val="008000"/>
+                </a:highlight>
+              </a:rPr>
+              <a:t> </a:t>
+            </a:r>
+            <a:r>
+              <a:rPr lang="en-GB" sz="1800">
+                <a:solidFill>
+                  <a:schemeClr val="bg1"/>
+                </a:solidFill>
+                <a:hlinkClick r:id="rId2">
+                  <a:extLst>
+                    <a:ext uri="{A12FA001-AC4F-418D-AE19-62706E023703}">
+                      <ahyp:hlinkClr xmlns:ahyp="http://schemas.microsoft.com/office/drawing/2018/hyperlinkcolor" val="tx"/>
+                    </a:ext>
+                  </a:extLst>
+                </a:hlinkClick>
+              </a:rPr>
+              <a:t>https://geredi-niyibigira-cenfri-ds-fellow-5twh6csf74r2x2mab9vkq2.streamlit.app</a:t>
+            </a:r>
+            <a:endParaRPr lang="en-US" sz="1800" dirty="0">
+              <a:solidFill>
+                <a:schemeClr val="bg1"/>
+              </a:solidFill>
+            </a:endParaRPr>
+          </a:p>
+        </p:txBody>
+      </p:sp>
+      <p:sp>
+        <p:nvSpPr>
+          <p:cNvPr id="3" name="TextBox 2">
+            <a:extLst>
+              <a:ext uri="{FF2B5EF4-FFF2-40B4-BE49-F238E27FC236}">
+                <a16:creationId xmlns:a16="http://schemas.microsoft.com/office/drawing/2014/main" id="{BE0DA4C7-E421-7015-B8B6-406A623BEC0A}"/>
+              </a:ext>
+            </a:extLst>
+          </p:cNvPr>
+          <p:cNvSpPr txBox="1"/>
+          <p:nvPr/>
+        </p:nvSpPr>
+        <p:spPr>
+          <a:xfrm>
+            <a:off x="2881085" y="326571"/>
+            <a:ext cx="4564743" cy="830997"/>
+          </a:xfrm>
+          <a:prstGeom prst="rect">
+            <a:avLst/>
+          </a:prstGeom>
+          <a:noFill/>
+        </p:spPr>
+        <p:txBody>
+          <a:bodyPr wrap="square" rtlCol="0">
+            <a:spAutoFit/>
+          </a:bodyPr>
+          <a:lstStyle/>
+          <a:p>
+            <a:r>
+              <a:rPr lang="en-GB" sz="4800" dirty="0"/>
+              <a:t>Thank You!</a:t>
+            </a:r>
+            <a:endParaRPr lang="en-RW" sz="4800" dirty="0"/>
+          </a:p>
+        </p:txBody>
+      </p:sp>
+    </p:spTree>
+    <p:extLst>
+      <p:ext uri="{BB962C8B-B14F-4D97-AF65-F5344CB8AC3E}">
+        <p14:creationId xmlns:p14="http://schemas.microsoft.com/office/powerpoint/2010/main" val="2027698905"/>
+      </p:ext>
+    </p:extLst>
   </p:cSld>
   <p:clrMapOvr>
     <a:masterClrMapping/>

</xml_diff>

<commit_message>
adding github link on the ppt
</commit_message>
<xml_diff>
--- a/Geredi-Niyibigira-Vehicle_Theft_Analysis_Presentation.pptx
+++ b/Geredi-Niyibigira-Vehicle_Theft_Analysis_Presentation.pptx
@@ -4710,23 +4710,23 @@
               <a:buNone/>
             </a:pPr>
             <a:r>
-              <a:rPr lang="en-GB" sz="1800" b="1">
+              <a:rPr lang="en-GB" sz="1600" b="1" dirty="0">
                 <a:highlight>
                   <a:srgbClr val="008000"/>
                 </a:highlight>
               </a:rPr>
-              <a:t>Explore Dashboard:</a:t>
-            </a:r>
-            <a:r>
-              <a:rPr lang="en-GB" sz="1800">
+              <a:t>Dashboard Link:</a:t>
+            </a:r>
+            <a:r>
+              <a:rPr lang="en-GB" sz="1600" dirty="0">
                 <a:highlight>
                   <a:srgbClr val="008000"/>
                 </a:highlight>
               </a:rPr>
-              <a:t> </a:t>
-            </a:r>
-            <a:r>
-              <a:rPr lang="en-GB" sz="1800">
+              <a:t>   </a:t>
+            </a:r>
+            <a:r>
+              <a:rPr lang="en-GB" sz="1600" dirty="0">
                 <a:solidFill>
                   <a:schemeClr val="bg1"/>
                 </a:solidFill>
@@ -4740,7 +4740,70 @@
               </a:rPr>
               <a:t>https://geredi-niyibigira-cenfri-ds-fellow-5twh6csf74r2x2mab9vkq2.streamlit.app</a:t>
             </a:r>
-            <a:endParaRPr lang="en-US" sz="1800" dirty="0">
+            <a:endParaRPr lang="en-GB" sz="1600" dirty="0">
+              <a:solidFill>
+                <a:schemeClr val="bg1"/>
+              </a:solidFill>
+            </a:endParaRPr>
+          </a:p>
+          <a:p>
+            <a:pPr marL="0" indent="0" algn="l">
+              <a:lnSpc>
+                <a:spcPts val="1920"/>
+              </a:lnSpc>
+              <a:buNone/>
+            </a:pPr>
+            <a:endParaRPr lang="en-GB" sz="1600" dirty="0">
+              <a:solidFill>
+                <a:schemeClr val="bg1"/>
+              </a:solidFill>
+            </a:endParaRPr>
+          </a:p>
+          <a:p>
+            <a:pPr marL="0" indent="0" algn="l">
+              <a:lnSpc>
+                <a:spcPts val="1920"/>
+              </a:lnSpc>
+              <a:buNone/>
+            </a:pPr>
+            <a:r>
+              <a:rPr lang="en-GB" sz="1600" b="1" dirty="0" err="1">
+                <a:highlight>
+                  <a:srgbClr val="008000"/>
+                </a:highlight>
+              </a:rPr>
+              <a:t>Github</a:t>
+            </a:r>
+            <a:r>
+              <a:rPr lang="en-GB" sz="1600" b="1" dirty="0">
+                <a:highlight>
+                  <a:srgbClr val="008000"/>
+                </a:highlight>
+              </a:rPr>
+              <a:t> Link:  </a:t>
+            </a:r>
+            <a:r>
+              <a:rPr lang="en-GB" sz="1600" b="1" dirty="0">
+                <a:solidFill>
+                  <a:schemeClr val="bg1"/>
+                </a:solidFill>
+              </a:rPr>
+              <a:t>https://github.com/GerediNIYIBIGIRA/geredi-niyibigira-cenfri-DS-Fellow</a:t>
+            </a:r>
+            <a:endParaRPr lang="en-GB" sz="1600" dirty="0">
+              <a:solidFill>
+                <a:schemeClr val="bg1"/>
+              </a:solidFill>
+            </a:endParaRPr>
+          </a:p>
+          <a:p>
+            <a:pPr marL="0" indent="0" algn="l">
+              <a:lnSpc>
+                <a:spcPts val="1920"/>
+              </a:lnSpc>
+              <a:buNone/>
+            </a:pPr>
+            <a:endParaRPr lang="en-GB" dirty="0">
               <a:solidFill>
                 <a:schemeClr val="bg1"/>
               </a:solidFill>

</xml_diff>